<commit_message>
Final review and prep for submission
</commit_message>
<xml_diff>
--- a/publications/Poster_Projeto_Informatico_194_LSTM.pptx
+++ b/publications/Poster_Projeto_Informatico_194_LSTM.pptx
@@ -6641,7 +6641,7 @@
         <p:spPr>
           <a:xfrm>
             <a:off x="9202984" y="3747683"/>
-            <a:ext cx="3190790" cy="646331"/>
+            <a:ext cx="3190790" cy="677108"/>
           </a:xfrm>
           <a:prstGeom prst="rect">
             <a:avLst/>
@@ -6708,7 +6708,7 @@
               <a:t>ConvLSTM</a:t>
             </a:r>
             <a:r>
-              <a:rPr lang="pt-PT" sz="1200" dirty="0">
+              <a:rPr lang="pt-PT" sz="1400" dirty="0">
                 <a:solidFill>
                   <a:schemeClr val="tx1">
                     <a:lumMod val="95000"/>
@@ -6716,7 +6716,18 @@
                   </a:schemeClr>
                 </a:solidFill>
               </a:rPr>
-              <a:t>: 97.71%</a:t>
+              <a:t>:</a:t>
+            </a:r>
+            <a:r>
+              <a:rPr lang="pt-PT" sz="1200" dirty="0">
+                <a:solidFill>
+                  <a:schemeClr val="tx1">
+                    <a:lumMod val="95000"/>
+                    <a:lumOff val="5000"/>
+                  </a:schemeClr>
+                </a:solidFill>
+              </a:rPr>
+              <a:t> 97.71%</a:t>
             </a:r>
           </a:p>
           <a:p>
@@ -6784,12 +6795,8 @@
               <a:t> </a:t>
             </a:r>
             <a:r>
-              <a:rPr lang="pt-PT" sz="1200" b="1" dirty="0" err="1"/>
-              <a:t>Accuracy</a:t>
-            </a:r>
-            <a:r>
               <a:rPr lang="pt-PT" sz="1200" b="1" dirty="0"/>
-              <a:t> </a:t>
+              <a:t>Accuracy </a:t>
             </a:r>
             <a:r>
               <a:rPr lang="pt-PT" sz="1200" b="1" dirty="0" err="1"/>
@@ -6800,8 +6807,19 @@
               <a:t>: </a:t>
             </a:r>
             <a:r>
+              <a:rPr lang="pt-PT" sz="1200" dirty="0">
+                <a:solidFill>
+                  <a:schemeClr val="tx1">
+                    <a:lumMod val="95000"/>
+                    <a:lumOff val="5000"/>
+                  </a:schemeClr>
+                </a:solidFill>
+              </a:rPr>
+              <a:t>96.56%</a:t>
+            </a:r>
+            <a:r>
               <a:rPr lang="pt-PT" sz="1400" dirty="0"/>
-              <a:t>99.62% </a:t>
+              <a:t> </a:t>
             </a:r>
             <a:endParaRPr lang="pt-PT" sz="1000" dirty="0"/>
           </a:p>

</xml_diff>